<commit_message>
Added Presentation Project Folder
</commit_message>
<xml_diff>
--- a/Documents/Presentatie/Theseus Pres.pptx
+++ b/Documents/Presentatie/Theseus Pres.pptx
@@ -243,7 +243,7 @@
           <a:p>
             <a:fld id="{266A6FFA-CCBE-43ED-9B11-EADFC1FE3F65}" type="datetimeFigureOut">
               <a:rPr lang="en-GB" smtClean="0"/>
-              <a:t>13/02/2017</a:t>
+              <a:t>14/02/2017</a:t>
             </a:fld>
             <a:endParaRPr lang="en-GB"/>
           </a:p>
@@ -413,7 +413,7 @@
           <a:p>
             <a:fld id="{266A6FFA-CCBE-43ED-9B11-EADFC1FE3F65}" type="datetimeFigureOut">
               <a:rPr lang="en-GB" smtClean="0"/>
-              <a:t>13/02/2017</a:t>
+              <a:t>14/02/2017</a:t>
             </a:fld>
             <a:endParaRPr lang="en-GB"/>
           </a:p>
@@ -593,7 +593,7 @@
           <a:p>
             <a:fld id="{266A6FFA-CCBE-43ED-9B11-EADFC1FE3F65}" type="datetimeFigureOut">
               <a:rPr lang="en-GB" smtClean="0"/>
-              <a:t>13/02/2017</a:t>
+              <a:t>14/02/2017</a:t>
             </a:fld>
             <a:endParaRPr lang="en-GB"/>
           </a:p>
@@ -763,7 +763,7 @@
           <a:p>
             <a:fld id="{266A6FFA-CCBE-43ED-9B11-EADFC1FE3F65}" type="datetimeFigureOut">
               <a:rPr lang="en-GB" smtClean="0"/>
-              <a:t>13/02/2017</a:t>
+              <a:t>14/02/2017</a:t>
             </a:fld>
             <a:endParaRPr lang="en-GB"/>
           </a:p>
@@ -1009,7 +1009,7 @@
           <a:p>
             <a:fld id="{266A6FFA-CCBE-43ED-9B11-EADFC1FE3F65}" type="datetimeFigureOut">
               <a:rPr lang="en-GB" smtClean="0"/>
-              <a:t>13/02/2017</a:t>
+              <a:t>14/02/2017</a:t>
             </a:fld>
             <a:endParaRPr lang="en-GB"/>
           </a:p>
@@ -1241,7 +1241,7 @@
           <a:p>
             <a:fld id="{266A6FFA-CCBE-43ED-9B11-EADFC1FE3F65}" type="datetimeFigureOut">
               <a:rPr lang="en-GB" smtClean="0"/>
-              <a:t>13/02/2017</a:t>
+              <a:t>14/02/2017</a:t>
             </a:fld>
             <a:endParaRPr lang="en-GB"/>
           </a:p>
@@ -1608,7 +1608,7 @@
           <a:p>
             <a:fld id="{266A6FFA-CCBE-43ED-9B11-EADFC1FE3F65}" type="datetimeFigureOut">
               <a:rPr lang="en-GB" smtClean="0"/>
-              <a:t>13/02/2017</a:t>
+              <a:t>14/02/2017</a:t>
             </a:fld>
             <a:endParaRPr lang="en-GB"/>
           </a:p>
@@ -1726,7 +1726,7 @@
           <a:p>
             <a:fld id="{266A6FFA-CCBE-43ED-9B11-EADFC1FE3F65}" type="datetimeFigureOut">
               <a:rPr lang="en-GB" smtClean="0"/>
-              <a:t>13/02/2017</a:t>
+              <a:t>14/02/2017</a:t>
             </a:fld>
             <a:endParaRPr lang="en-GB"/>
           </a:p>
@@ -1821,7 +1821,7 @@
           <a:p>
             <a:fld id="{266A6FFA-CCBE-43ED-9B11-EADFC1FE3F65}" type="datetimeFigureOut">
               <a:rPr lang="en-GB" smtClean="0"/>
-              <a:t>13/02/2017</a:t>
+              <a:t>14/02/2017</a:t>
             </a:fld>
             <a:endParaRPr lang="en-GB"/>
           </a:p>
@@ -2098,7 +2098,7 @@
           <a:p>
             <a:fld id="{266A6FFA-CCBE-43ED-9B11-EADFC1FE3F65}" type="datetimeFigureOut">
               <a:rPr lang="en-GB" smtClean="0"/>
-              <a:t>13/02/2017</a:t>
+              <a:t>14/02/2017</a:t>
             </a:fld>
             <a:endParaRPr lang="en-GB"/>
           </a:p>
@@ -2351,7 +2351,7 @@
           <a:p>
             <a:fld id="{266A6FFA-CCBE-43ED-9B11-EADFC1FE3F65}" type="datetimeFigureOut">
               <a:rPr lang="en-GB" smtClean="0"/>
-              <a:t>13/02/2017</a:t>
+              <a:t>14/02/2017</a:t>
             </a:fld>
             <a:endParaRPr lang="en-GB"/>
           </a:p>
@@ -2564,7 +2564,7 @@
           <a:p>
             <a:fld id="{266A6FFA-CCBE-43ED-9B11-EADFC1FE3F65}" type="datetimeFigureOut">
               <a:rPr lang="en-GB" smtClean="0"/>
-              <a:t>13/02/2017</a:t>
+              <a:t>14/02/2017</a:t>
             </a:fld>
             <a:endParaRPr lang="en-GB"/>
           </a:p>
@@ -3022,7 +3022,7 @@
       </p:sp>
       <p:pic>
         <p:nvPicPr>
-          <p:cNvPr id="8" name="Picture 7"/>
+          <p:cNvPr id="6" name="Picture 5"/>
           <p:cNvPicPr>
             <a:picLocks noChangeAspect="1"/>
           </p:cNvPicPr>
@@ -3042,8 +3042,38 @@
         </p:blipFill>
         <p:spPr>
           <a:xfrm>
-            <a:off x="1085070" y="2592152"/>
-            <a:ext cx="3938993" cy="5089138"/>
+            <a:off x="1741743" y="2428866"/>
+            <a:ext cx="2625643" cy="8752142"/>
+          </a:xfrm>
+          <a:prstGeom prst="rect">
+            <a:avLst/>
+          </a:prstGeom>
+        </p:spPr>
+      </p:pic>
+      <p:pic>
+        <p:nvPicPr>
+          <p:cNvPr id="7" name="Picture 6"/>
+          <p:cNvPicPr>
+            <a:picLocks noChangeAspect="1"/>
+          </p:cNvPicPr>
+          <p:nvPr/>
+        </p:nvPicPr>
+        <p:blipFill>
+          <a:blip r:embed="rId3">
+            <a:extLst>
+              <a:ext uri="{28A0092B-C50C-407E-A947-70E740481C1C}">
+                <a14:useLocalDpi xmlns:a14="http://schemas.microsoft.com/office/drawing/2010/main" val="0"/>
+              </a:ext>
+            </a:extLst>
+          </a:blip>
+          <a:stretch>
+            <a:fillRect/>
+          </a:stretch>
+        </p:blipFill>
+        <p:spPr>
+          <a:xfrm>
+            <a:off x="8229718" y="551429"/>
+            <a:ext cx="2602382" cy="8791832"/>
           </a:xfrm>
           <a:prstGeom prst="rect">
             <a:avLst/>

</xml_diff>